<commit_message>
Updated prime number tutorial for comparison of approach 1 and 2
</commit_message>
<xml_diff>
--- a/Python_Basics/Prime_Numbers/images.pptx
+++ b/Python_Basics/Prime_Numbers/images.pptx
@@ -6,6 +6,8 @@
   </p:sldMasterIdLst>
   <p:sldIdLst>
     <p:sldId id="256" r:id="rId2"/>
+    <p:sldId id="257" r:id="rId3"/>
+    <p:sldId id="258" r:id="rId4"/>
   </p:sldIdLst>
   <p:sldSz cx="12192000" cy="6858000"/>
   <p:notesSz cx="6858000" cy="9144000"/>
@@ -104,6 +106,11 @@
       </a:defRPr>
     </a:lvl9pPr>
   </p:defaultTextStyle>
+  <p:extLst>
+    <p:ext uri="{EFAFB233-063F-42B5-8137-9DF3F51BA10A}">
+      <p15:sldGuideLst xmlns:p15="http://schemas.microsoft.com/office/powerpoint/2012/main"/>
+    </p:ext>
+  </p:extLst>
 </p:presentation>
 </file>
 
@@ -3068,6 +3075,238 @@
 </p:sld>
 </file>
 
+<file path=ppt/slides/slide2.xml><?xml version="1.0" encoding="utf-8"?>
+<p:sld xmlns:a="http://schemas.openxmlformats.org/drawingml/2006/main" xmlns:r="http://schemas.openxmlformats.org/officeDocument/2006/relationships" xmlns:p="http://schemas.openxmlformats.org/presentationml/2006/main">
+  <p:cSld>
+    <p:spTree>
+      <p:nvGrpSpPr>
+        <p:cNvPr id="1" name=""/>
+        <p:cNvGrpSpPr/>
+        <p:nvPr/>
+      </p:nvGrpSpPr>
+      <p:grpSpPr>
+        <a:xfrm>
+          <a:off x="0" y="0"/>
+          <a:ext cx="0" cy="0"/>
+          <a:chOff x="0" y="0"/>
+          <a:chExt cx="0" cy="0"/>
+        </a:xfrm>
+      </p:grpSpPr>
+      <p:grpSp>
+        <p:nvGrpSpPr>
+          <p:cNvPr id="12" name="Group 11"/>
+          <p:cNvGrpSpPr/>
+          <p:nvPr/>
+        </p:nvGrpSpPr>
+        <p:grpSpPr>
+          <a:xfrm>
+            <a:off x="1457325" y="1318181"/>
+            <a:ext cx="9217024" cy="4580968"/>
+            <a:chOff x="1457325" y="1318181"/>
+            <a:chExt cx="9217024" cy="4580968"/>
+          </a:xfrm>
+        </p:grpSpPr>
+        <p:sp>
+          <p:nvSpPr>
+            <p:cNvPr id="2" name="TextBox 1"/>
+            <p:cNvSpPr txBox="1"/>
+            <p:nvPr/>
+          </p:nvSpPr>
+          <p:spPr>
+            <a:xfrm>
+              <a:off x="1960562" y="1318181"/>
+              <a:ext cx="3400425" cy="461665"/>
+            </a:xfrm>
+            <a:prstGeom prst="rect">
+              <a:avLst/>
+            </a:prstGeom>
+            <a:noFill/>
+          </p:spPr>
+          <p:txBody>
+            <a:bodyPr wrap="square" rtlCol="0">
+              <a:spAutoFit/>
+            </a:bodyPr>
+            <a:lstStyle/>
+            <a:p>
+              <a:pPr algn="ctr"/>
+              <a:r>
+                <a:rPr lang="en-US" sz="2400" dirty="0" smtClean="0"/>
+                <a:t>Approach 1</a:t>
+              </a:r>
+              <a:endParaRPr lang="en-US" sz="2400" dirty="0"/>
+            </a:p>
+          </p:txBody>
+        </p:sp>
+        <p:sp>
+          <p:nvSpPr>
+            <p:cNvPr id="7" name="TextBox 6"/>
+            <p:cNvSpPr txBox="1"/>
+            <p:nvPr/>
+          </p:nvSpPr>
+          <p:spPr>
+            <a:xfrm>
+              <a:off x="6770687" y="1318181"/>
+              <a:ext cx="3400425" cy="461665"/>
+            </a:xfrm>
+            <a:prstGeom prst="rect">
+              <a:avLst/>
+            </a:prstGeom>
+            <a:noFill/>
+          </p:spPr>
+          <p:txBody>
+            <a:bodyPr wrap="square" rtlCol="0">
+              <a:spAutoFit/>
+            </a:bodyPr>
+            <a:lstStyle/>
+            <a:p>
+              <a:pPr algn="ctr"/>
+              <a:r>
+                <a:rPr lang="en-US" sz="2400" dirty="0" smtClean="0"/>
+                <a:t>Approach 2</a:t>
+              </a:r>
+              <a:endParaRPr lang="en-US" sz="2400" dirty="0"/>
+            </a:p>
+          </p:txBody>
+        </p:sp>
+        <p:pic>
+          <p:nvPicPr>
+            <p:cNvPr id="3" name="Picture 2"/>
+            <p:cNvPicPr>
+              <a:picLocks noChangeAspect="1"/>
+            </p:cNvPicPr>
+            <p:nvPr/>
+          </p:nvPicPr>
+          <p:blipFill>
+            <a:blip r:embed="rId2">
+              <a:extLst>
+                <a:ext uri="{28A0092B-C50C-407E-A947-70E740481C1C}">
+                  <a14:useLocalDpi xmlns:a14="http://schemas.microsoft.com/office/drawing/2010/main" val="0"/>
+                </a:ext>
+              </a:extLst>
+            </a:blip>
+            <a:stretch>
+              <a:fillRect/>
+            </a:stretch>
+          </p:blipFill>
+          <p:spPr>
+            <a:xfrm>
+              <a:off x="6267449" y="1962149"/>
+              <a:ext cx="4406900" cy="2133600"/>
+            </a:xfrm>
+            <a:prstGeom prst="rect">
+              <a:avLst/>
+            </a:prstGeom>
+          </p:spPr>
+        </p:pic>
+        <p:pic>
+          <p:nvPicPr>
+            <p:cNvPr id="9" name="Picture 8"/>
+            <p:cNvPicPr>
+              <a:picLocks noChangeAspect="1"/>
+            </p:cNvPicPr>
+            <p:nvPr/>
+          </p:nvPicPr>
+          <p:blipFill>
+            <a:blip r:embed="rId3">
+              <a:extLst>
+                <a:ext uri="{28A0092B-C50C-407E-A947-70E740481C1C}">
+                  <a14:useLocalDpi xmlns:a14="http://schemas.microsoft.com/office/drawing/2010/main" val="0"/>
+                </a:ext>
+              </a:extLst>
+            </a:blip>
+            <a:stretch>
+              <a:fillRect/>
+            </a:stretch>
+          </p:blipFill>
+          <p:spPr>
+            <a:xfrm>
+              <a:off x="1457325" y="1962149"/>
+              <a:ext cx="4406900" cy="3937000"/>
+            </a:xfrm>
+            <a:prstGeom prst="rect">
+              <a:avLst/>
+            </a:prstGeom>
+          </p:spPr>
+        </p:pic>
+      </p:grpSp>
+    </p:spTree>
+    <p:extLst>
+      <p:ext uri="{BB962C8B-B14F-4D97-AF65-F5344CB8AC3E}">
+        <p14:creationId xmlns:p14="http://schemas.microsoft.com/office/powerpoint/2010/main" val="234022664"/>
+      </p:ext>
+    </p:extLst>
+  </p:cSld>
+  <p:clrMapOvr>
+    <a:masterClrMapping/>
+  </p:clrMapOvr>
+</p:sld>
+</file>
+
+<file path=ppt/slides/slide3.xml><?xml version="1.0" encoding="utf-8"?>
+<p:sld xmlns:a="http://schemas.openxmlformats.org/drawingml/2006/main" xmlns:r="http://schemas.openxmlformats.org/officeDocument/2006/relationships" xmlns:p="http://schemas.openxmlformats.org/presentationml/2006/main">
+  <p:cSld>
+    <p:spTree>
+      <p:nvGrpSpPr>
+        <p:cNvPr id="1" name=""/>
+        <p:cNvGrpSpPr/>
+        <p:nvPr/>
+      </p:nvGrpSpPr>
+      <p:grpSpPr>
+        <a:xfrm>
+          <a:off x="0" y="0"/>
+          <a:ext cx="0" cy="0"/>
+          <a:chOff x="0" y="0"/>
+          <a:chExt cx="0" cy="0"/>
+        </a:xfrm>
+      </p:grpSpPr>
+      <p:pic>
+        <p:nvPicPr>
+          <p:cNvPr id="4" name="Picture 3"/>
+          <p:cNvPicPr>
+            <a:picLocks noChangeAspect="1"/>
+          </p:cNvPicPr>
+          <p:nvPr/>
+        </p:nvPicPr>
+        <p:blipFill>
+          <a:blip r:embed="rId2">
+            <a:extLst>
+              <a:ext uri="{28A0092B-C50C-407E-A947-70E740481C1C}">
+                <a14:useLocalDpi xmlns:a14="http://schemas.microsoft.com/office/drawing/2010/main" val="0"/>
+              </a:ext>
+            </a:extLst>
+          </a:blip>
+          <a:stretch>
+            <a:fillRect/>
+          </a:stretch>
+        </p:blipFill>
+        <p:spPr>
+          <a:xfrm>
+            <a:off x="1485900" y="1104900"/>
+            <a:ext cx="9217152" cy="4626864"/>
+          </a:xfrm>
+          <a:prstGeom prst="rect">
+            <a:avLst/>
+          </a:prstGeom>
+          <a:ln w="19050">
+            <a:solidFill>
+              <a:schemeClr val="tx1"/>
+            </a:solidFill>
+          </a:ln>
+        </p:spPr>
+      </p:pic>
+    </p:spTree>
+    <p:extLst>
+      <p:ext uri="{BB962C8B-B14F-4D97-AF65-F5344CB8AC3E}">
+        <p14:creationId xmlns:p14="http://schemas.microsoft.com/office/powerpoint/2010/main" val="257270482"/>
+      </p:ext>
+    </p:extLst>
+  </p:cSld>
+  <p:clrMapOvr>
+    <a:masterClrMapping/>
+  </p:clrMapOvr>
+</p:sld>
+</file>
+
 <file path=ppt/theme/theme1.xml><?xml version="1.0" encoding="utf-8"?>
 <a:theme xmlns:a="http://schemas.openxmlformats.org/drawingml/2006/main" name="Office Theme">
   <a:themeElements>

</xml_diff>

<commit_message>
updated prime number tutorial for approach 3
</commit_message>
<xml_diff>
--- a/Python_Basics/Prime_Numbers/images.pptx
+++ b/Python_Basics/Prime_Numbers/images.pptx
@@ -8,6 +8,7 @@
     <p:sldId id="256" r:id="rId2"/>
     <p:sldId id="257" r:id="rId3"/>
     <p:sldId id="258" r:id="rId4"/>
+    <p:sldId id="259" r:id="rId5"/>
   </p:sldIdLst>
   <p:sldSz cx="12192000" cy="6858000"/>
   <p:notesSz cx="6858000" cy="9144000"/>
@@ -245,7 +246,7 @@
           <a:p>
             <a:fld id="{DE8BBDA4-B12F-DB48-AB32-F6B4BD8F6F20}" type="datetimeFigureOut">
               <a:rPr lang="en-US" smtClean="0"/>
-              <a:t>5/3/18</a:t>
+              <a:t>5/4/18</a:t>
             </a:fld>
             <a:endParaRPr lang="en-US"/>
           </a:p>
@@ -415,7 +416,7 @@
           <a:p>
             <a:fld id="{DE8BBDA4-B12F-DB48-AB32-F6B4BD8F6F20}" type="datetimeFigureOut">
               <a:rPr lang="en-US" smtClean="0"/>
-              <a:t>5/3/18</a:t>
+              <a:t>5/4/18</a:t>
             </a:fld>
             <a:endParaRPr lang="en-US"/>
           </a:p>
@@ -595,7 +596,7 @@
           <a:p>
             <a:fld id="{DE8BBDA4-B12F-DB48-AB32-F6B4BD8F6F20}" type="datetimeFigureOut">
               <a:rPr lang="en-US" smtClean="0"/>
-              <a:t>5/3/18</a:t>
+              <a:t>5/4/18</a:t>
             </a:fld>
             <a:endParaRPr lang="en-US"/>
           </a:p>
@@ -765,7 +766,7 @@
           <a:p>
             <a:fld id="{DE8BBDA4-B12F-DB48-AB32-F6B4BD8F6F20}" type="datetimeFigureOut">
               <a:rPr lang="en-US" smtClean="0"/>
-              <a:t>5/3/18</a:t>
+              <a:t>5/4/18</a:t>
             </a:fld>
             <a:endParaRPr lang="en-US"/>
           </a:p>
@@ -1011,7 +1012,7 @@
           <a:p>
             <a:fld id="{DE8BBDA4-B12F-DB48-AB32-F6B4BD8F6F20}" type="datetimeFigureOut">
               <a:rPr lang="en-US" smtClean="0"/>
-              <a:t>5/3/18</a:t>
+              <a:t>5/4/18</a:t>
             </a:fld>
             <a:endParaRPr lang="en-US"/>
           </a:p>
@@ -1243,7 +1244,7 @@
           <a:p>
             <a:fld id="{DE8BBDA4-B12F-DB48-AB32-F6B4BD8F6F20}" type="datetimeFigureOut">
               <a:rPr lang="en-US" smtClean="0"/>
-              <a:t>5/3/18</a:t>
+              <a:t>5/4/18</a:t>
             </a:fld>
             <a:endParaRPr lang="en-US"/>
           </a:p>
@@ -1610,7 +1611,7 @@
           <a:p>
             <a:fld id="{DE8BBDA4-B12F-DB48-AB32-F6B4BD8F6F20}" type="datetimeFigureOut">
               <a:rPr lang="en-US" smtClean="0"/>
-              <a:t>5/3/18</a:t>
+              <a:t>5/4/18</a:t>
             </a:fld>
             <a:endParaRPr lang="en-US"/>
           </a:p>
@@ -1728,7 +1729,7 @@
           <a:p>
             <a:fld id="{DE8BBDA4-B12F-DB48-AB32-F6B4BD8F6F20}" type="datetimeFigureOut">
               <a:rPr lang="en-US" smtClean="0"/>
-              <a:t>5/3/18</a:t>
+              <a:t>5/4/18</a:t>
             </a:fld>
             <a:endParaRPr lang="en-US"/>
           </a:p>
@@ -1823,7 +1824,7 @@
           <a:p>
             <a:fld id="{DE8BBDA4-B12F-DB48-AB32-F6B4BD8F6F20}" type="datetimeFigureOut">
               <a:rPr lang="en-US" smtClean="0"/>
-              <a:t>5/3/18</a:t>
+              <a:t>5/4/18</a:t>
             </a:fld>
             <a:endParaRPr lang="en-US"/>
           </a:p>
@@ -2100,7 +2101,7 @@
           <a:p>
             <a:fld id="{DE8BBDA4-B12F-DB48-AB32-F6B4BD8F6F20}" type="datetimeFigureOut">
               <a:rPr lang="en-US" smtClean="0"/>
-              <a:t>5/3/18</a:t>
+              <a:t>5/4/18</a:t>
             </a:fld>
             <a:endParaRPr lang="en-US"/>
           </a:p>
@@ -2353,7 +2354,7 @@
           <a:p>
             <a:fld id="{DE8BBDA4-B12F-DB48-AB32-F6B4BD8F6F20}" type="datetimeFigureOut">
               <a:rPr lang="en-US" smtClean="0"/>
-              <a:t>5/3/18</a:t>
+              <a:t>5/4/18</a:t>
             </a:fld>
             <a:endParaRPr lang="en-US"/>
           </a:p>
@@ -2566,7 +2567,7 @@
           <a:p>
             <a:fld id="{DE8BBDA4-B12F-DB48-AB32-F6B4BD8F6F20}" type="datetimeFigureOut">
               <a:rPr lang="en-US" smtClean="0"/>
-              <a:t>5/3/18</a:t>
+              <a:t>5/4/18</a:t>
             </a:fld>
             <a:endParaRPr lang="en-US"/>
           </a:p>
@@ -3307,6 +3308,542 @@
 </p:sld>
 </file>
 
+<file path=ppt/slides/slide4.xml><?xml version="1.0" encoding="utf-8"?>
+<p:sld xmlns:a="http://schemas.openxmlformats.org/drawingml/2006/main" xmlns:r="http://schemas.openxmlformats.org/officeDocument/2006/relationships" xmlns:p="http://schemas.openxmlformats.org/presentationml/2006/main">
+  <p:cSld>
+    <p:spTree>
+      <p:nvGrpSpPr>
+        <p:cNvPr id="1" name=""/>
+        <p:cNvGrpSpPr/>
+        <p:nvPr/>
+      </p:nvGrpSpPr>
+      <p:grpSpPr>
+        <a:xfrm>
+          <a:off x="0" y="0"/>
+          <a:ext cx="0" cy="0"/>
+          <a:chOff x="0" y="0"/>
+          <a:chExt cx="0" cy="0"/>
+        </a:xfrm>
+      </p:grpSpPr>
+      <p:sp>
+        <p:nvSpPr>
+          <p:cNvPr id="3" name="TextBox 2"/>
+          <p:cNvSpPr txBox="1"/>
+          <p:nvPr/>
+        </p:nvSpPr>
+        <p:spPr>
+          <a:xfrm>
+            <a:off x="2809875" y="1236107"/>
+            <a:ext cx="2990850" cy="369332"/>
+          </a:xfrm>
+          <a:prstGeom prst="rect">
+            <a:avLst/>
+          </a:prstGeom>
+          <a:noFill/>
+        </p:spPr>
+        <p:txBody>
+          <a:bodyPr wrap="square" rtlCol="0">
+            <a:spAutoFit/>
+          </a:bodyPr>
+          <a:lstStyle/>
+          <a:p>
+            <a:r>
+              <a:rPr lang="en-US" dirty="0" smtClean="0"/>
+              <a:t>15 / 2 = 7 remainder 1</a:t>
+            </a:r>
+            <a:endParaRPr lang="en-US" dirty="0"/>
+          </a:p>
+        </p:txBody>
+      </p:sp>
+      <p:sp>
+        <p:nvSpPr>
+          <p:cNvPr id="6" name="TextBox 5"/>
+          <p:cNvSpPr txBox="1"/>
+          <p:nvPr/>
+        </p:nvSpPr>
+        <p:spPr>
+          <a:xfrm>
+            <a:off x="2809875" y="866775"/>
+            <a:ext cx="1743075" cy="369332"/>
+          </a:xfrm>
+          <a:prstGeom prst="rect">
+            <a:avLst/>
+          </a:prstGeom>
+          <a:noFill/>
+        </p:spPr>
+        <p:txBody>
+          <a:bodyPr wrap="square" rtlCol="0">
+            <a:spAutoFit/>
+          </a:bodyPr>
+          <a:lstStyle/>
+          <a:p>
+            <a:r>
+              <a:rPr lang="en-US" dirty="0" smtClean="0"/>
+              <a:t>Factors of 15</a:t>
+            </a:r>
+            <a:endParaRPr lang="en-US" dirty="0"/>
+          </a:p>
+        </p:txBody>
+      </p:sp>
+      <p:sp>
+        <p:nvSpPr>
+          <p:cNvPr id="10" name="TextBox 9"/>
+          <p:cNvSpPr txBox="1"/>
+          <p:nvPr/>
+        </p:nvSpPr>
+        <p:spPr>
+          <a:xfrm>
+            <a:off x="2809874" y="1605439"/>
+            <a:ext cx="2990850" cy="369332"/>
+          </a:xfrm>
+          <a:prstGeom prst="rect">
+            <a:avLst/>
+          </a:prstGeom>
+          <a:noFill/>
+        </p:spPr>
+        <p:txBody>
+          <a:bodyPr wrap="square" rtlCol="0">
+            <a:spAutoFit/>
+          </a:bodyPr>
+          <a:lstStyle/>
+          <a:p>
+            <a:r>
+              <a:rPr lang="en-US" dirty="0" smtClean="0"/>
+              <a:t>15 / 3 = 5 remainder 0</a:t>
+            </a:r>
+            <a:endParaRPr lang="en-US" dirty="0"/>
+          </a:p>
+        </p:txBody>
+      </p:sp>
+      <p:sp>
+        <p:nvSpPr>
+          <p:cNvPr id="11" name="TextBox 10"/>
+          <p:cNvSpPr txBox="1"/>
+          <p:nvPr/>
+        </p:nvSpPr>
+        <p:spPr>
+          <a:xfrm>
+            <a:off x="2809874" y="1974771"/>
+            <a:ext cx="2990850" cy="369332"/>
+          </a:xfrm>
+          <a:prstGeom prst="rect">
+            <a:avLst/>
+          </a:prstGeom>
+          <a:noFill/>
+        </p:spPr>
+        <p:txBody>
+          <a:bodyPr wrap="square" rtlCol="0">
+            <a:spAutoFit/>
+          </a:bodyPr>
+          <a:lstStyle/>
+          <a:p>
+            <a:r>
+              <a:rPr lang="en-US" dirty="0" smtClean="0"/>
+              <a:t>15 / 4 = 3 remainder 3</a:t>
+            </a:r>
+            <a:endParaRPr lang="en-US" dirty="0"/>
+          </a:p>
+        </p:txBody>
+      </p:sp>
+      <p:sp>
+        <p:nvSpPr>
+          <p:cNvPr id="12" name="TextBox 11"/>
+          <p:cNvSpPr txBox="1"/>
+          <p:nvPr/>
+        </p:nvSpPr>
+        <p:spPr>
+          <a:xfrm>
+            <a:off x="2809874" y="2344103"/>
+            <a:ext cx="2990850" cy="369332"/>
+          </a:xfrm>
+          <a:prstGeom prst="rect">
+            <a:avLst/>
+          </a:prstGeom>
+          <a:noFill/>
+        </p:spPr>
+        <p:txBody>
+          <a:bodyPr wrap="square" rtlCol="0">
+            <a:spAutoFit/>
+          </a:bodyPr>
+          <a:lstStyle/>
+          <a:p>
+            <a:r>
+              <a:rPr lang="en-US" dirty="0" smtClean="0"/>
+              <a:t>15 </a:t>
+            </a:r>
+            <a:r>
+              <a:rPr lang="en-US" smtClean="0"/>
+              <a:t>/ 5 </a:t>
+            </a:r>
+            <a:r>
+              <a:rPr lang="en-US" dirty="0" smtClean="0"/>
+              <a:t>= 3 </a:t>
+            </a:r>
+            <a:r>
+              <a:rPr lang="en-US" smtClean="0"/>
+              <a:t>remainder 0</a:t>
+            </a:r>
+            <a:endParaRPr lang="en-US" dirty="0"/>
+          </a:p>
+        </p:txBody>
+      </p:sp>
+      <p:sp>
+        <p:nvSpPr>
+          <p:cNvPr id="13" name="TextBox 12"/>
+          <p:cNvSpPr txBox="1"/>
+          <p:nvPr/>
+        </p:nvSpPr>
+        <p:spPr>
+          <a:xfrm>
+            <a:off x="2809874" y="2713435"/>
+            <a:ext cx="2990850" cy="369332"/>
+          </a:xfrm>
+          <a:prstGeom prst="rect">
+            <a:avLst/>
+          </a:prstGeom>
+          <a:noFill/>
+        </p:spPr>
+        <p:txBody>
+          <a:bodyPr wrap="square" rtlCol="0">
+            <a:spAutoFit/>
+          </a:bodyPr>
+          <a:lstStyle/>
+          <a:p>
+            <a:r>
+              <a:rPr lang="en-US" dirty="0" smtClean="0"/>
+              <a:t>15 </a:t>
+            </a:r>
+            <a:r>
+              <a:rPr lang="en-US" smtClean="0"/>
+              <a:t>/ 6 = 2 remainder 3</a:t>
+            </a:r>
+            <a:endParaRPr lang="en-US" dirty="0"/>
+          </a:p>
+        </p:txBody>
+      </p:sp>
+      <p:sp>
+        <p:nvSpPr>
+          <p:cNvPr id="14" name="TextBox 13"/>
+          <p:cNvSpPr txBox="1"/>
+          <p:nvPr/>
+        </p:nvSpPr>
+        <p:spPr>
+          <a:xfrm>
+            <a:off x="2809874" y="3082767"/>
+            <a:ext cx="2990850" cy="369332"/>
+          </a:xfrm>
+          <a:prstGeom prst="rect">
+            <a:avLst/>
+          </a:prstGeom>
+          <a:noFill/>
+        </p:spPr>
+        <p:txBody>
+          <a:bodyPr wrap="square" rtlCol="0">
+            <a:spAutoFit/>
+          </a:bodyPr>
+          <a:lstStyle/>
+          <a:p>
+            <a:r>
+              <a:rPr lang="en-US" dirty="0" smtClean="0"/>
+              <a:t>15 / 7 = 2 remainder 1</a:t>
+            </a:r>
+            <a:endParaRPr lang="en-US" dirty="0"/>
+          </a:p>
+        </p:txBody>
+      </p:sp>
+      <p:sp>
+        <p:nvSpPr>
+          <p:cNvPr id="15" name="TextBox 14"/>
+          <p:cNvSpPr txBox="1"/>
+          <p:nvPr/>
+        </p:nvSpPr>
+        <p:spPr>
+          <a:xfrm>
+            <a:off x="2809874" y="3452099"/>
+            <a:ext cx="2990850" cy="369332"/>
+          </a:xfrm>
+          <a:prstGeom prst="rect">
+            <a:avLst/>
+          </a:prstGeom>
+          <a:noFill/>
+        </p:spPr>
+        <p:txBody>
+          <a:bodyPr wrap="square" rtlCol="0">
+            <a:spAutoFit/>
+          </a:bodyPr>
+          <a:lstStyle/>
+          <a:p>
+            <a:r>
+              <a:rPr lang="en-US" dirty="0" smtClean="0"/>
+              <a:t>15 </a:t>
+            </a:r>
+            <a:r>
+              <a:rPr lang="en-US" smtClean="0"/>
+              <a:t>/ 8 = 1 remainder 7</a:t>
+            </a:r>
+            <a:endParaRPr lang="en-US" dirty="0"/>
+          </a:p>
+        </p:txBody>
+      </p:sp>
+      <p:sp>
+        <p:nvSpPr>
+          <p:cNvPr id="16" name="TextBox 15"/>
+          <p:cNvSpPr txBox="1"/>
+          <p:nvPr/>
+        </p:nvSpPr>
+        <p:spPr>
+          <a:xfrm>
+            <a:off x="2809874" y="3788691"/>
+            <a:ext cx="2990850" cy="369332"/>
+          </a:xfrm>
+          <a:prstGeom prst="rect">
+            <a:avLst/>
+          </a:prstGeom>
+          <a:noFill/>
+        </p:spPr>
+        <p:txBody>
+          <a:bodyPr wrap="square" rtlCol="0">
+            <a:spAutoFit/>
+          </a:bodyPr>
+          <a:lstStyle/>
+          <a:p>
+            <a:r>
+              <a:rPr lang="en-US" dirty="0" smtClean="0"/>
+              <a:t>15 / 9 = 1 remainder 6</a:t>
+            </a:r>
+            <a:endParaRPr lang="en-US" dirty="0"/>
+          </a:p>
+        </p:txBody>
+      </p:sp>
+      <p:sp>
+        <p:nvSpPr>
+          <p:cNvPr id="17" name="TextBox 16"/>
+          <p:cNvSpPr txBox="1"/>
+          <p:nvPr/>
+        </p:nvSpPr>
+        <p:spPr>
+          <a:xfrm>
+            <a:off x="2809874" y="4125283"/>
+            <a:ext cx="2990850" cy="369332"/>
+          </a:xfrm>
+          <a:prstGeom prst="rect">
+            <a:avLst/>
+          </a:prstGeom>
+          <a:noFill/>
+        </p:spPr>
+        <p:txBody>
+          <a:bodyPr wrap="square" rtlCol="0">
+            <a:spAutoFit/>
+          </a:bodyPr>
+          <a:lstStyle/>
+          <a:p>
+            <a:r>
+              <a:rPr lang="en-US" dirty="0" smtClean="0"/>
+              <a:t>15 / 10 = 1 remainder 5</a:t>
+            </a:r>
+            <a:endParaRPr lang="en-US" dirty="0"/>
+          </a:p>
+        </p:txBody>
+      </p:sp>
+      <p:sp>
+        <p:nvSpPr>
+          <p:cNvPr id="18" name="TextBox 17"/>
+          <p:cNvSpPr txBox="1"/>
+          <p:nvPr/>
+        </p:nvSpPr>
+        <p:spPr>
+          <a:xfrm>
+            <a:off x="2809874" y="4461875"/>
+            <a:ext cx="2990850" cy="369332"/>
+          </a:xfrm>
+          <a:prstGeom prst="rect">
+            <a:avLst/>
+          </a:prstGeom>
+          <a:noFill/>
+        </p:spPr>
+        <p:txBody>
+          <a:bodyPr wrap="square" rtlCol="0">
+            <a:spAutoFit/>
+          </a:bodyPr>
+          <a:lstStyle/>
+          <a:p>
+            <a:r>
+              <a:rPr lang="en-US" dirty="0" smtClean="0"/>
+              <a:t>15 </a:t>
+            </a:r>
+            <a:r>
+              <a:rPr lang="en-US" smtClean="0"/>
+              <a:t>/ 11 </a:t>
+            </a:r>
+            <a:r>
+              <a:rPr lang="en-US" dirty="0" smtClean="0"/>
+              <a:t>= 1 </a:t>
+            </a:r>
+            <a:r>
+              <a:rPr lang="en-US" smtClean="0"/>
+              <a:t>remainder 4</a:t>
+            </a:r>
+            <a:endParaRPr lang="en-US" dirty="0"/>
+          </a:p>
+        </p:txBody>
+      </p:sp>
+      <p:sp>
+        <p:nvSpPr>
+          <p:cNvPr id="19" name="TextBox 18"/>
+          <p:cNvSpPr txBox="1"/>
+          <p:nvPr/>
+        </p:nvSpPr>
+        <p:spPr>
+          <a:xfrm>
+            <a:off x="2809874" y="4798467"/>
+            <a:ext cx="2990850" cy="369332"/>
+          </a:xfrm>
+          <a:prstGeom prst="rect">
+            <a:avLst/>
+          </a:prstGeom>
+          <a:noFill/>
+        </p:spPr>
+        <p:txBody>
+          <a:bodyPr wrap="square" rtlCol="0">
+            <a:spAutoFit/>
+          </a:bodyPr>
+          <a:lstStyle/>
+          <a:p>
+            <a:r>
+              <a:rPr lang="en-US" dirty="0" smtClean="0"/>
+              <a:t>15 / 12 = 1 remainder 3</a:t>
+            </a:r>
+            <a:endParaRPr lang="en-US" dirty="0"/>
+          </a:p>
+        </p:txBody>
+      </p:sp>
+      <p:sp>
+        <p:nvSpPr>
+          <p:cNvPr id="20" name="TextBox 19"/>
+          <p:cNvSpPr txBox="1"/>
+          <p:nvPr/>
+        </p:nvSpPr>
+        <p:spPr>
+          <a:xfrm>
+            <a:off x="2809874" y="5135059"/>
+            <a:ext cx="2990850" cy="369332"/>
+          </a:xfrm>
+          <a:prstGeom prst="rect">
+            <a:avLst/>
+          </a:prstGeom>
+          <a:noFill/>
+        </p:spPr>
+        <p:txBody>
+          <a:bodyPr wrap="square" rtlCol="0">
+            <a:spAutoFit/>
+          </a:bodyPr>
+          <a:lstStyle/>
+          <a:p>
+            <a:r>
+              <a:rPr lang="en-US" dirty="0" smtClean="0"/>
+              <a:t>15 </a:t>
+            </a:r>
+            <a:r>
+              <a:rPr lang="en-US" smtClean="0"/>
+              <a:t>/ 13 </a:t>
+            </a:r>
+            <a:r>
+              <a:rPr lang="en-US" dirty="0" smtClean="0"/>
+              <a:t>= 1 </a:t>
+            </a:r>
+            <a:r>
+              <a:rPr lang="en-US" smtClean="0"/>
+              <a:t>remainder 2</a:t>
+            </a:r>
+            <a:endParaRPr lang="en-US" dirty="0"/>
+          </a:p>
+        </p:txBody>
+      </p:sp>
+      <p:sp>
+        <p:nvSpPr>
+          <p:cNvPr id="21" name="TextBox 20"/>
+          <p:cNvSpPr txBox="1"/>
+          <p:nvPr/>
+        </p:nvSpPr>
+        <p:spPr>
+          <a:xfrm>
+            <a:off x="2809874" y="5471651"/>
+            <a:ext cx="2990850" cy="369332"/>
+          </a:xfrm>
+          <a:prstGeom prst="rect">
+            <a:avLst/>
+          </a:prstGeom>
+          <a:noFill/>
+        </p:spPr>
+        <p:txBody>
+          <a:bodyPr wrap="square" rtlCol="0">
+            <a:spAutoFit/>
+          </a:bodyPr>
+          <a:lstStyle/>
+          <a:p>
+            <a:r>
+              <a:rPr lang="en-US" dirty="0" smtClean="0"/>
+              <a:t>15 / 14 = 1 remainder 1</a:t>
+            </a:r>
+            <a:endParaRPr lang="en-US" dirty="0"/>
+          </a:p>
+        </p:txBody>
+      </p:sp>
+      <p:sp>
+        <p:nvSpPr>
+          <p:cNvPr id="22" name="TextBox 21"/>
+          <p:cNvSpPr txBox="1"/>
+          <p:nvPr/>
+        </p:nvSpPr>
+        <p:spPr>
+          <a:xfrm>
+            <a:off x="2809874" y="5808243"/>
+            <a:ext cx="2990850" cy="369332"/>
+          </a:xfrm>
+          <a:prstGeom prst="rect">
+            <a:avLst/>
+          </a:prstGeom>
+          <a:noFill/>
+        </p:spPr>
+        <p:txBody>
+          <a:bodyPr wrap="square" rtlCol="0">
+            <a:spAutoFit/>
+          </a:bodyPr>
+          <a:lstStyle/>
+          <a:p>
+            <a:r>
+              <a:rPr lang="en-US" dirty="0" smtClean="0"/>
+              <a:t>15 </a:t>
+            </a:r>
+            <a:r>
+              <a:rPr lang="en-US" smtClean="0"/>
+              <a:t>/ 15 </a:t>
+            </a:r>
+            <a:r>
+              <a:rPr lang="en-US" dirty="0" smtClean="0"/>
+              <a:t>= 1 </a:t>
+            </a:r>
+            <a:r>
+              <a:rPr lang="en-US" smtClean="0"/>
+              <a:t>remainder 0</a:t>
+            </a:r>
+            <a:endParaRPr lang="en-US" dirty="0"/>
+          </a:p>
+        </p:txBody>
+      </p:sp>
+    </p:spTree>
+    <p:extLst>
+      <p:ext uri="{BB962C8B-B14F-4D97-AF65-F5344CB8AC3E}">
+        <p14:creationId xmlns:p14="http://schemas.microsoft.com/office/powerpoint/2010/main" val="334621899"/>
+      </p:ext>
+    </p:extLst>
+  </p:cSld>
+  <p:clrMapOvr>
+    <a:masterClrMapping/>
+  </p:clrMapOvr>
+</p:sld>
+</file>
+
 <file path=ppt/theme/theme1.xml><?xml version="1.0" encoding="utf-8"?>
 <a:theme xmlns:a="http://schemas.openxmlformats.org/drawingml/2006/main" name="Office Theme">
   <a:themeElements>

</xml_diff>